<commit_message>
added language drivers and resources slides
</commit_message>
<xml_diff>
--- a/mongodb/mongodb-slides.pptx
+++ b/mongodb/mongodb-slides.pptx
@@ -5,10 +5,10 @@
     <p:sldMasterId id="2147483648" r:id="rId1"/>
   </p:sldMasterIdLst>
   <p:notesMasterIdLst>
-    <p:notesMasterId r:id="rId25"/>
+    <p:notesMasterId r:id="rId27"/>
   </p:notesMasterIdLst>
   <p:handoutMasterIdLst>
-    <p:handoutMasterId r:id="rId26"/>
+    <p:handoutMasterId r:id="rId28"/>
   </p:handoutMasterIdLst>
   <p:sldIdLst>
     <p:sldId id="256" r:id="rId2"/>
@@ -34,6 +34,8 @@
     <p:sldId id="277" r:id="rId22"/>
     <p:sldId id="278" r:id="rId23"/>
     <p:sldId id="279" r:id="rId24"/>
+    <p:sldId id="282" r:id="rId25"/>
+    <p:sldId id="283" r:id="rId26"/>
   </p:sldIdLst>
   <p:sldSz cx="9144000" cy="6858000" type="screen4x3"/>
   <p:notesSz cx="6858000" cy="9144000"/>
@@ -14770,6 +14772,457 @@
     <p:extLst>
       <p:ext uri="{BB962C8B-B14F-4D97-AF65-F5344CB8AC3E}">
         <p14:creationId xmlns:p14="http://schemas.microsoft.com/office/powerpoint/2010/main" val="948633024"/>
+      </p:ext>
+    </p:extLst>
+  </p:cSld>
+  <p:clrMapOvr>
+    <a:masterClrMapping/>
+  </p:clrMapOvr>
+  <p:transition xmlns:p14="http://schemas.microsoft.com/office/powerpoint/2010/main">
+    <p:fade thruBlk="1"/>
+  </p:transition>
+</p:sld>
+</file>
+
+<file path=ppt/slides/slide24.xml><?xml version="1.0" encoding="utf-8"?>
+<p:sld xmlns:a="http://schemas.openxmlformats.org/drawingml/2006/main" xmlns:r="http://schemas.openxmlformats.org/officeDocument/2006/relationships" xmlns:p="http://schemas.openxmlformats.org/presentationml/2006/main">
+  <p:cSld>
+    <p:spTree>
+      <p:nvGrpSpPr>
+        <p:cNvPr id="1" name=""/>
+        <p:cNvGrpSpPr/>
+        <p:nvPr/>
+      </p:nvGrpSpPr>
+      <p:grpSpPr>
+        <a:xfrm>
+          <a:off x="0" y="0"/>
+          <a:ext cx="0" cy="0"/>
+          <a:chOff x="0" y="0"/>
+          <a:chExt cx="0" cy="0"/>
+        </a:xfrm>
+      </p:grpSpPr>
+      <p:sp>
+        <p:nvSpPr>
+          <p:cNvPr id="2" name="Title 1"/>
+          <p:cNvSpPr>
+            <a:spLocks noGrp="1"/>
+          </p:cNvSpPr>
+          <p:nvPr>
+            <p:ph type="title"/>
+          </p:nvPr>
+        </p:nvSpPr>
+        <p:spPr>
+          <a:xfrm>
+            <a:off x="321623" y="418905"/>
+            <a:ext cx="2914692" cy="307777"/>
+          </a:xfrm>
+        </p:spPr>
+        <p:txBody>
+          <a:bodyPr/>
+          <a:lstStyle/>
+          <a:p>
+            <a:r>
+              <a:rPr lang="en-US" dirty="0" smtClean="0"/>
+              <a:t>LANGUAGE DRIVERS</a:t>
+            </a:r>
+            <a:endParaRPr lang="en-US" dirty="0"/>
+          </a:p>
+        </p:txBody>
+      </p:sp>
+      <p:sp>
+        <p:nvSpPr>
+          <p:cNvPr id="3" name="Slide Number Placeholder 2"/>
+          <p:cNvSpPr>
+            <a:spLocks noGrp="1"/>
+          </p:cNvSpPr>
+          <p:nvPr>
+            <p:ph type="sldNum" sz="quarter" idx="10"/>
+          </p:nvPr>
+        </p:nvSpPr>
+        <p:spPr/>
+        <p:txBody>
+          <a:bodyPr/>
+          <a:lstStyle/>
+          <a:p>
+            <a:fld id="{FF67BF5B-7344-D747-A0C2-CBD7B2ACBC85}" type="slidenum">
+              <a:rPr lang="en-US" smtClean="0"/>
+              <a:pPr/>
+              <a:t>24</a:t>
+            </a:fld>
+            <a:endParaRPr lang="en-US" dirty="0"/>
+          </a:p>
+        </p:txBody>
+      </p:sp>
+      <p:sp>
+        <p:nvSpPr>
+          <p:cNvPr id="4" name="Text Placeholder 3"/>
+          <p:cNvSpPr>
+            <a:spLocks noGrp="1"/>
+          </p:cNvSpPr>
+          <p:nvPr>
+            <p:ph type="body" sz="quarter" idx="11"/>
+          </p:nvPr>
+        </p:nvSpPr>
+        <p:spPr/>
+        <p:txBody>
+          <a:bodyPr/>
+          <a:lstStyle/>
+          <a:p>
+            <a:r>
+              <a:rPr lang="en-US" dirty="0" smtClean="0"/>
+              <a:t>Available and well supported in most languages.</a:t>
+            </a:r>
+          </a:p>
+          <a:p>
+            <a:endParaRPr lang="en-US" dirty="0"/>
+          </a:p>
+          <a:p>
+            <a:r>
+              <a:rPr lang="en-US" dirty="0" smtClean="0"/>
+              <a:t>Overview of </a:t>
+            </a:r>
+            <a:r>
+              <a:rPr lang="en-US" dirty="0"/>
+              <a:t>supported drivers: </a:t>
+            </a:r>
+            <a:r>
+              <a:rPr lang="en-US" dirty="0">
+                <a:hlinkClick r:id="rId2"/>
+              </a:rPr>
+              <a:t>http://docs.mongodb.org/ecosystem/drivers</a:t>
+            </a:r>
+            <a:r>
+              <a:rPr lang="en-US" dirty="0" smtClean="0">
+                <a:hlinkClick r:id="rId2"/>
+              </a:rPr>
+              <a:t>/</a:t>
+            </a:r>
+            <a:endParaRPr lang="en-US" dirty="0" smtClean="0"/>
+          </a:p>
+          <a:p>
+            <a:endParaRPr lang="en-US" dirty="0"/>
+          </a:p>
+          <a:p>
+            <a:r>
+              <a:rPr lang="en-US" dirty="0" smtClean="0"/>
+              <a:t>Separate free online courses for Java, </a:t>
+            </a:r>
+            <a:r>
+              <a:rPr lang="en-US" dirty="0" err="1" smtClean="0"/>
+              <a:t>Node.js</a:t>
+            </a:r>
+            <a:r>
+              <a:rPr lang="en-US" dirty="0" smtClean="0"/>
+              <a:t>, .NET and </a:t>
+            </a:r>
+            <a:r>
+              <a:rPr lang="en-US" dirty="0"/>
+              <a:t>Python developers </a:t>
+            </a:r>
+            <a:r>
+              <a:rPr lang="en-US" dirty="0" smtClean="0"/>
+              <a:t>available at </a:t>
+            </a:r>
+            <a:r>
+              <a:rPr lang="en-US" dirty="0" smtClean="0">
+                <a:hlinkClick r:id="rId3"/>
+              </a:rPr>
+              <a:t>https</a:t>
+            </a:r>
+            <a:r>
+              <a:rPr lang="en-US" dirty="0">
+                <a:hlinkClick r:id="rId3"/>
+              </a:rPr>
+              <a:t>://university.mongodb.com</a:t>
+            </a:r>
+            <a:r>
+              <a:rPr lang="en-US" dirty="0" smtClean="0">
+                <a:hlinkClick r:id="rId3"/>
+              </a:rPr>
+              <a:t>/</a:t>
+            </a:r>
+            <a:endParaRPr lang="en-US" dirty="0" smtClean="0"/>
+          </a:p>
+          <a:p>
+            <a:endParaRPr lang="en-US" dirty="0" smtClean="0"/>
+          </a:p>
+          <a:p>
+            <a:r>
+              <a:rPr lang="en-US" dirty="0" smtClean="0"/>
+              <a:t>Most of the videos they use in the </a:t>
+            </a:r>
+            <a:r>
+              <a:rPr lang="en-US" dirty="0"/>
+              <a:t>courses are here </a:t>
+            </a:r>
+            <a:r>
+              <a:rPr lang="en-US" dirty="0">
+                <a:hlinkClick r:id="rId4"/>
+              </a:rPr>
+              <a:t>https://www.youtube.com/channel/UCO6fpQsiBhglTVGsjC1on7A/</a:t>
+            </a:r>
+            <a:r>
+              <a:rPr lang="en-US" dirty="0" smtClean="0">
+                <a:hlinkClick r:id="rId4"/>
+              </a:rPr>
+              <a:t>playlists</a:t>
+            </a:r>
+            <a:endParaRPr lang="en-US" dirty="0" smtClean="0"/>
+          </a:p>
+          <a:p>
+            <a:endParaRPr lang="en-US" dirty="0"/>
+          </a:p>
+        </p:txBody>
+      </p:sp>
+    </p:spTree>
+    <p:extLst>
+      <p:ext uri="{BB962C8B-B14F-4D97-AF65-F5344CB8AC3E}">
+        <p14:creationId xmlns:p14="http://schemas.microsoft.com/office/powerpoint/2010/main" val="1579256501"/>
+      </p:ext>
+    </p:extLst>
+  </p:cSld>
+  <p:clrMapOvr>
+    <a:masterClrMapping/>
+  </p:clrMapOvr>
+  <p:transition xmlns:p14="http://schemas.microsoft.com/office/powerpoint/2010/main">
+    <p:fade thruBlk="1"/>
+  </p:transition>
+</p:sld>
+</file>
+
+<file path=ppt/slides/slide25.xml><?xml version="1.0" encoding="utf-8"?>
+<p:sld xmlns:a="http://schemas.openxmlformats.org/drawingml/2006/main" xmlns:r="http://schemas.openxmlformats.org/officeDocument/2006/relationships" xmlns:p="http://schemas.openxmlformats.org/presentationml/2006/main">
+  <p:cSld>
+    <p:spTree>
+      <p:nvGrpSpPr>
+        <p:cNvPr id="1" name=""/>
+        <p:cNvGrpSpPr/>
+        <p:nvPr/>
+      </p:nvGrpSpPr>
+      <p:grpSpPr>
+        <a:xfrm>
+          <a:off x="0" y="0"/>
+          <a:ext cx="0" cy="0"/>
+          <a:chOff x="0" y="0"/>
+          <a:chExt cx="0" cy="0"/>
+        </a:xfrm>
+      </p:grpSpPr>
+      <p:sp>
+        <p:nvSpPr>
+          <p:cNvPr id="2" name="Title 1"/>
+          <p:cNvSpPr>
+            <a:spLocks noGrp="1"/>
+          </p:cNvSpPr>
+          <p:nvPr>
+            <p:ph type="title"/>
+          </p:nvPr>
+        </p:nvSpPr>
+        <p:spPr>
+          <a:xfrm>
+            <a:off x="321623" y="418905"/>
+            <a:ext cx="1800185" cy="307777"/>
+          </a:xfrm>
+        </p:spPr>
+        <p:txBody>
+          <a:bodyPr/>
+          <a:lstStyle/>
+          <a:p>
+            <a:r>
+              <a:rPr lang="en-US" dirty="0" smtClean="0"/>
+              <a:t>Resources</a:t>
+            </a:r>
+            <a:endParaRPr lang="en-US" dirty="0"/>
+          </a:p>
+        </p:txBody>
+      </p:sp>
+      <p:sp>
+        <p:nvSpPr>
+          <p:cNvPr id="3" name="Slide Number Placeholder 2"/>
+          <p:cNvSpPr>
+            <a:spLocks noGrp="1"/>
+          </p:cNvSpPr>
+          <p:nvPr>
+            <p:ph type="sldNum" sz="quarter" idx="10"/>
+          </p:nvPr>
+        </p:nvSpPr>
+        <p:spPr/>
+        <p:txBody>
+          <a:bodyPr/>
+          <a:lstStyle/>
+          <a:p>
+            <a:fld id="{FF67BF5B-7344-D747-A0C2-CBD7B2ACBC85}" type="slidenum">
+              <a:rPr lang="en-US" smtClean="0"/>
+              <a:pPr/>
+              <a:t>25</a:t>
+            </a:fld>
+            <a:endParaRPr lang="en-US" dirty="0"/>
+          </a:p>
+        </p:txBody>
+      </p:sp>
+      <p:sp>
+        <p:nvSpPr>
+          <p:cNvPr id="4" name="Text Placeholder 3"/>
+          <p:cNvSpPr>
+            <a:spLocks noGrp="1"/>
+          </p:cNvSpPr>
+          <p:nvPr>
+            <p:ph type="body" sz="quarter" idx="11"/>
+          </p:nvPr>
+        </p:nvSpPr>
+        <p:spPr>
+          <a:xfrm>
+            <a:off x="321623" y="1262063"/>
+            <a:ext cx="8487218" cy="5399087"/>
+          </a:xfrm>
+        </p:spPr>
+        <p:txBody>
+          <a:bodyPr/>
+          <a:lstStyle/>
+          <a:p>
+            <a:r>
+              <a:rPr lang="en-US" dirty="0"/>
+              <a:t>Course repository - </a:t>
+            </a:r>
+            <a:r>
+              <a:rPr lang="en-US" dirty="0">
+                <a:hlinkClick r:id="rId2"/>
+              </a:rPr>
+              <a:t>https://github.com/bekkopen/databasekurs/tree/master/</a:t>
+            </a:r>
+            <a:r>
+              <a:rPr lang="en-US" dirty="0" smtClean="0">
+                <a:hlinkClick r:id="rId2"/>
+              </a:rPr>
+              <a:t>mongodb</a:t>
+            </a:r>
+            <a:endParaRPr lang="en-US" dirty="0" smtClean="0"/>
+          </a:p>
+          <a:p>
+            <a:endParaRPr lang="en-US" dirty="0"/>
+          </a:p>
+          <a:p>
+            <a:r>
+              <a:rPr lang="en-US" dirty="0" err="1" smtClean="0"/>
+              <a:t>MongoDB</a:t>
+            </a:r>
+            <a:r>
+              <a:rPr lang="en-US" dirty="0" smtClean="0"/>
+              <a:t> </a:t>
+            </a:r>
+            <a:r>
+              <a:rPr lang="en-US" dirty="0"/>
+              <a:t>- </a:t>
+            </a:r>
+            <a:r>
+              <a:rPr lang="en-US" dirty="0">
+                <a:hlinkClick r:id="rId3"/>
+              </a:rPr>
+              <a:t>http://www.mongodb.com</a:t>
+            </a:r>
+            <a:r>
+              <a:rPr lang="en-US" dirty="0" smtClean="0">
+                <a:hlinkClick r:id="rId3"/>
+              </a:rPr>
+              <a:t>/</a:t>
+            </a:r>
+            <a:endParaRPr lang="en-US" dirty="0" smtClean="0"/>
+          </a:p>
+          <a:p>
+            <a:r>
+              <a:rPr lang="en-US" dirty="0" smtClean="0"/>
+              <a:t> </a:t>
+            </a:r>
+          </a:p>
+          <a:p>
+            <a:r>
+              <a:rPr lang="en-US" dirty="0"/>
+              <a:t>Online docs - </a:t>
+            </a:r>
+            <a:r>
+              <a:rPr lang="en-US" dirty="0">
+                <a:hlinkClick r:id="rId4"/>
+              </a:rPr>
+              <a:t>http://docs.mongodb.org/manual</a:t>
+            </a:r>
+            <a:r>
+              <a:rPr lang="en-US" dirty="0" smtClean="0">
+                <a:hlinkClick r:id="rId4"/>
+              </a:rPr>
+              <a:t>/</a:t>
+            </a:r>
+            <a:endParaRPr lang="en-US" dirty="0" smtClean="0"/>
+          </a:p>
+          <a:p>
+            <a:endParaRPr lang="en-US" dirty="0" smtClean="0"/>
+          </a:p>
+          <a:p>
+            <a:r>
+              <a:rPr lang="en-US" dirty="0" smtClean="0"/>
+              <a:t>Free online </a:t>
+            </a:r>
+            <a:r>
+              <a:rPr lang="en-US" dirty="0"/>
+              <a:t>courses - </a:t>
+            </a:r>
+            <a:r>
+              <a:rPr lang="en-US" dirty="0" smtClean="0">
+                <a:hlinkClick r:id="rId5"/>
+              </a:rPr>
+              <a:t>https:</a:t>
+            </a:r>
+            <a:r>
+              <a:rPr lang="en-US" dirty="0">
+                <a:hlinkClick r:id="rId5"/>
+              </a:rPr>
+              <a:t>//university.mongodb.com</a:t>
+            </a:r>
+            <a:r>
+              <a:rPr lang="en-US" dirty="0" smtClean="0">
+                <a:hlinkClick r:id="rId5"/>
+              </a:rPr>
+              <a:t>/</a:t>
+            </a:r>
+            <a:endParaRPr lang="en-US" dirty="0" smtClean="0"/>
+          </a:p>
+          <a:p>
+            <a:endParaRPr lang="en-US" dirty="0" smtClean="0"/>
+          </a:p>
+          <a:p>
+            <a:r>
+              <a:rPr lang="en-US" dirty="0" smtClean="0"/>
+              <a:t>About version 3.0 </a:t>
+            </a:r>
+            <a:r>
+              <a:rPr lang="en-US" dirty="0"/>
+              <a:t>coming in </a:t>
+            </a:r>
+            <a:r>
+              <a:rPr lang="en-US" dirty="0" smtClean="0"/>
+              <a:t>March - </a:t>
+            </a:r>
+            <a:r>
+              <a:rPr lang="en-US" dirty="0">
+                <a:hlinkClick r:id="rId6"/>
+              </a:rPr>
+              <a:t>http://www.mongodb.com/blog/post/announcing-mongodb-</a:t>
+            </a:r>
+            <a:r>
+              <a:rPr lang="en-US" dirty="0" smtClean="0">
+                <a:hlinkClick r:id="rId6"/>
+              </a:rPr>
+              <a:t>30</a:t>
+            </a:r>
+            <a:endParaRPr lang="en-US" dirty="0" smtClean="0"/>
+          </a:p>
+          <a:p>
+            <a:endParaRPr lang="en-US" dirty="0"/>
+          </a:p>
+        </p:txBody>
+      </p:sp>
+    </p:spTree>
+    <p:extLst>
+      <p:ext uri="{BB962C8B-B14F-4D97-AF65-F5344CB8AC3E}">
+        <p14:creationId xmlns:p14="http://schemas.microsoft.com/office/powerpoint/2010/main" val="4005046410"/>
       </p:ext>
     </p:extLst>
   </p:cSld>

</xml_diff>

<commit_message>
how to get started
</commit_message>
<xml_diff>
--- a/mongodb/mongodb-slides.pptx
+++ b/mongodb/mongodb-slides.pptx
@@ -12463,15 +12463,7 @@
             </a:r>
             <a:r>
               <a:rPr lang="en-US" dirty="0" smtClean="0"/>
-              <a:t>“$set”: </a:t>
-            </a:r>
-            <a:r>
-              <a:rPr lang="en-US" dirty="0" smtClean="0"/>
-              <a:t>{name: “Richard M. Nixon”</a:t>
-            </a:r>
-            <a:r>
-              <a:rPr lang="en-US" dirty="0" smtClean="0"/>
-              <a:t>}</a:t>
+              <a:t>“$set”: {name: “Richard M. Nixon”}</a:t>
             </a:r>
           </a:p>
           <a:p>
@@ -12698,12 +12690,23 @@
           <a:bodyPr/>
           <a:lstStyle/>
           <a:p>
+            <a:pPr marL="342900" indent="-342900">
+              <a:buAutoNum type="arabicPeriod"/>
+            </a:pPr>
             <a:r>
               <a:rPr lang="en-US" dirty="0" err="1" smtClean="0"/>
               <a:t>Velg</a:t>
             </a:r>
             <a:r>
               <a:rPr lang="en-US" dirty="0" smtClean="0"/>
+              <a:t> </a:t>
+            </a:r>
+            <a:r>
+              <a:rPr lang="en-US" dirty="0" err="1" smtClean="0"/>
+              <a:t>dere</a:t>
+            </a:r>
+            <a:r>
+              <a:rPr lang="en-US" dirty="0" smtClean="0"/>
               <a:t> en server </a:t>
             </a:r>
             <a:r>
@@ -12712,81 +12715,149 @@
             </a:r>
             <a:r>
               <a:rPr lang="en-US" dirty="0" smtClean="0"/>
+              <a:t> marker </a:t>
+            </a:r>
+            <a:r>
+              <a:rPr lang="en-US" dirty="0" smtClean="0"/>
+              <a:t>den med </a:t>
+            </a:r>
+            <a:r>
+              <a:rPr lang="en-US" dirty="0" err="1" smtClean="0"/>
+              <a:t>navn</a:t>
+            </a:r>
+            <a:r>
+              <a:rPr lang="en-US" dirty="0" smtClean="0"/>
               <a:t> </a:t>
             </a:r>
             <a:r>
               <a:rPr lang="en-US" dirty="0" err="1" smtClean="0"/>
-              <a:t>skriv</a:t>
-            </a:r>
-            <a:r>
-              <a:rPr lang="en-US" dirty="0" smtClean="0"/>
-              <a:t> </a:t>
-            </a:r>
-            <a:r>
-              <a:rPr lang="en-US" dirty="0" err="1" smtClean="0"/>
-              <a:t>deres</a:t>
-            </a:r>
-            <a:r>
-              <a:rPr lang="en-US" dirty="0" smtClean="0"/>
-              <a:t> </a:t>
-            </a:r>
-            <a:r>
-              <a:rPr lang="en-US" dirty="0" err="1" smtClean="0"/>
-              <a:t>navn</a:t>
-            </a:r>
-            <a:r>
-              <a:rPr lang="en-US" dirty="0" smtClean="0"/>
-              <a:t> </a:t>
-            </a:r>
-            <a:r>
-              <a:rPr lang="en-US" dirty="0" err="1" smtClean="0"/>
-              <a:t>ved</a:t>
-            </a:r>
-            <a:r>
-              <a:rPr lang="en-US" dirty="0" smtClean="0"/>
-              <a:t> den: </a:t>
-            </a:r>
-            <a:r>
-              <a:rPr lang="en-US" dirty="0" smtClean="0">
+              <a:t>på</a:t>
+            </a:r>
+            <a:r>
+              <a:rPr lang="en-US" dirty="0" smtClean="0"/>
+              <a:t>: </a:t>
+            </a:r>
+            <a:r>
+              <a:rPr lang="en-US" i="1" u="sng" dirty="0" smtClean="0">
                 <a:hlinkClick r:id="rId2"/>
               </a:rPr>
               <a:t>http</a:t>
             </a:r>
             <a:r>
-              <a:rPr lang="en-US" dirty="0">
+              <a:rPr lang="en-US" i="1" u="sng" dirty="0">
                 <a:hlinkClick r:id="rId2"/>
               </a:rPr>
-              <a:t>://bit.ly/</a:t>
-            </a:r>
-            <a:r>
-              <a:rPr lang="en-US" dirty="0" smtClean="0">
+              <a:t>:</a:t>
+            </a:r>
+            <a:r>
+              <a:rPr lang="en-US" i="1" u="sng" dirty="0" smtClean="0">
                 <a:hlinkClick r:id="rId2"/>
               </a:rPr>
-              <a:t>1z7E3Ou</a:t>
-            </a:r>
+              <a:t>/</a:t>
+            </a:r>
+            <a:r>
+              <a:rPr lang="en-US" i="1" u="sng" dirty="0">
+                <a:hlinkClick r:id="rId2"/>
+              </a:rPr>
+              <a:t>/</a:t>
+            </a:r>
+            <a:r>
+              <a:rPr lang="en-US" i="1" u="sng" dirty="0" smtClean="0">
+                <a:hlinkClick r:id="rId2"/>
+              </a:rPr>
+              <a:t>bit.ly/</a:t>
+            </a:r>
+            <a:r>
+              <a:rPr lang="en-US" i="1" u="sng" dirty="0">
+                <a:hlinkClick r:id="rId2"/>
+              </a:rPr>
+              <a:t>mongo-</a:t>
+            </a:r>
+            <a:r>
+              <a:rPr lang="en-US" i="1" u="sng" dirty="0" smtClean="0">
+                <a:hlinkClick r:id="rId2"/>
+              </a:rPr>
+              <a:t>ip</a:t>
+            </a:r>
+            <a:endParaRPr lang="en-US" i="1" u="sng" dirty="0" smtClean="0"/>
+          </a:p>
+          <a:p>
             <a:endParaRPr lang="en-US" dirty="0" smtClean="0"/>
           </a:p>
           <a:p>
+            <a:r>
+              <a:rPr lang="en-US" dirty="0" smtClean="0"/>
+              <a:t>2. </a:t>
+            </a:r>
+            <a:r>
+              <a:rPr lang="en-US" dirty="0" err="1" smtClean="0"/>
+              <a:t>Åpne</a:t>
+            </a:r>
+            <a:r>
+              <a:rPr lang="en-US" dirty="0" smtClean="0"/>
+              <a:t> </a:t>
+            </a:r>
+            <a:r>
+              <a:rPr lang="en-US" dirty="0" smtClean="0"/>
+              <a:t>en terminal:</a:t>
+            </a:r>
+          </a:p>
+          <a:p>
+            <a:r>
+              <a:rPr lang="en-US" dirty="0" smtClean="0"/>
+              <a:t>&gt; </a:t>
+            </a:r>
+            <a:r>
+              <a:rPr lang="en-US" dirty="0" err="1" smtClean="0"/>
+              <a:t>ssh</a:t>
+            </a:r>
+            <a:r>
+              <a:rPr lang="en-US" dirty="0" smtClean="0"/>
+              <a:t> </a:t>
+            </a:r>
+            <a:r>
+              <a:rPr lang="en-US" dirty="0" err="1" smtClean="0"/>
+              <a:t>mongokurs</a:t>
+            </a:r>
+            <a:r>
+              <a:rPr lang="en-US" dirty="0" smtClean="0"/>
+              <a:t>@&lt;</a:t>
+            </a:r>
+            <a:r>
+              <a:rPr lang="en-US" dirty="0" err="1" smtClean="0"/>
+              <a:t>ipadresse</a:t>
+            </a:r>
+            <a:r>
+              <a:rPr lang="en-US" dirty="0" smtClean="0"/>
+              <a:t>&gt;</a:t>
+            </a:r>
+          </a:p>
+          <a:p>
+            <a:r>
+              <a:rPr lang="en-US" dirty="0" err="1" smtClean="0"/>
+              <a:t>Passord</a:t>
+            </a:r>
+            <a:r>
+              <a:rPr lang="en-US" dirty="0" smtClean="0"/>
+              <a:t>: </a:t>
+            </a:r>
+            <a:r>
+              <a:rPr lang="en-US" dirty="0" err="1" smtClean="0"/>
+              <a:t>mongoerkult</a:t>
+            </a:r>
             <a:endParaRPr lang="en-US" dirty="0" smtClean="0"/>
           </a:p>
           <a:p>
-            <a:r>
-              <a:rPr lang="en-US" dirty="0" err="1" smtClean="0"/>
-              <a:t>Åpne</a:t>
-            </a:r>
-            <a:r>
-              <a:rPr lang="en-US" dirty="0" smtClean="0"/>
-              <a:t> en terminal:</a:t>
-            </a:r>
-          </a:p>
-          <a:p>
-            <a:r>
-              <a:rPr lang="en-US" dirty="0" smtClean="0"/>
-              <a:t>&gt; </a:t>
-            </a:r>
-            <a:r>
-              <a:rPr lang="en-US" dirty="0" err="1" smtClean="0"/>
-              <a:t>ssh</a:t>
+            <a:endParaRPr lang="en-US" dirty="0"/>
+          </a:p>
+          <a:p>
+            <a:r>
+              <a:rPr lang="en-US" dirty="0" smtClean="0"/>
+              <a:t>3. Finn </a:t>
+            </a:r>
+            <a:r>
+              <a:rPr lang="en-US" dirty="0" err="1" smtClean="0"/>
+              <a:t>oppgavesett</a:t>
             </a:r>
             <a:r>
               <a:rPr lang="en-US" dirty="0" smtClean="0"/>
@@ -12794,35 +12865,56 @@
             </a:r>
             <a:r>
               <a:rPr lang="en-US" dirty="0" err="1" smtClean="0"/>
-              <a:t>mongokurs</a:t>
-            </a:r>
-            <a:r>
-              <a:rPr lang="en-US" dirty="0" smtClean="0"/>
-              <a:t>@&lt;</a:t>
-            </a:r>
-            <a:r>
-              <a:rPr lang="en-US" dirty="0" err="1" smtClean="0"/>
-              <a:t>ipadresse</a:t>
-            </a:r>
-            <a:r>
-              <a:rPr lang="en-US" dirty="0" smtClean="0"/>
-              <a:t>&gt;</a:t>
-            </a:r>
-          </a:p>
-          <a:p>
-            <a:r>
-              <a:rPr lang="en-US" dirty="0" err="1" smtClean="0"/>
-              <a:t>Passord</a:t>
-            </a:r>
-            <a:r>
-              <a:rPr lang="en-US" dirty="0" smtClean="0"/>
-              <a:t>: </a:t>
-            </a:r>
-            <a:r>
-              <a:rPr lang="en-US" dirty="0" err="1"/>
-              <a:t>mongoerkult</a:t>
-            </a:r>
-            <a:endParaRPr lang="en-US" dirty="0" smtClean="0"/>
+              <a:t>på</a:t>
+            </a:r>
+            <a:r>
+              <a:rPr lang="en-US" dirty="0" smtClean="0"/>
+              <a:t>:</a:t>
+            </a:r>
+          </a:p>
+          <a:p>
+            <a:r>
+              <a:rPr lang="en-US" dirty="0" smtClean="0"/>
+              <a:t>-    </a:t>
+            </a:r>
+            <a:r>
+              <a:rPr lang="en-US" dirty="0" err="1" smtClean="0"/>
+              <a:t>Github.com</a:t>
+            </a:r>
+            <a:r>
+              <a:rPr lang="en-US" dirty="0" smtClean="0"/>
+              <a:t>/</a:t>
+            </a:r>
+            <a:r>
+              <a:rPr lang="en-US" dirty="0" err="1" smtClean="0"/>
+              <a:t>bekkopen</a:t>
+            </a:r>
+            <a:r>
+              <a:rPr lang="en-US" dirty="0" smtClean="0"/>
+              <a:t>/</a:t>
+            </a:r>
+            <a:r>
+              <a:rPr lang="en-US" dirty="0" err="1" smtClean="0"/>
+              <a:t>databasekurs</a:t>
+            </a:r>
+            <a:r>
+              <a:rPr lang="en-US" dirty="0" smtClean="0"/>
+              <a:t>/</a:t>
+            </a:r>
+          </a:p>
+          <a:p>
+            <a:pPr marL="285750" indent="-285750">
+              <a:buFontTx/>
+              <a:buChar char="-"/>
+            </a:pPr>
+            <a:r>
+              <a:rPr lang="en-US" dirty="0" err="1" smtClean="0"/>
+              <a:t>Mongodb</a:t>
+            </a:r>
+            <a:r>
+              <a:rPr lang="en-US" dirty="0" smtClean="0"/>
+              <a:t> -&gt; exercises</a:t>
+            </a:r>
           </a:p>
           <a:p>
             <a:endParaRPr lang="en-US" dirty="0"/>
@@ -14534,11 +14626,6 @@
               </a:rPr>
               <a:t>Passport</a:t>
             </a:r>
-            <a:endParaRPr lang="en-US" sz="1400" dirty="0" smtClean="0">
-              <a:solidFill>
-                <a:schemeClr val="tx1"/>
-              </a:solidFill>
-            </a:endParaRPr>
           </a:p>
         </p:txBody>
       </p:sp>
@@ -14737,11 +14824,6 @@
               </a:rPr>
               <a:t>User</a:t>
             </a:r>
-            <a:endParaRPr lang="en-US" sz="1400" dirty="0" smtClean="0">
-              <a:solidFill>
-                <a:schemeClr val="tx1"/>
-              </a:solidFill>
-            </a:endParaRPr>
           </a:p>
         </p:txBody>
       </p:sp>
@@ -14910,11 +14992,6 @@
               </a:rPr>
               <a:t>Cart</a:t>
             </a:r>
-            <a:endParaRPr lang="en-US" sz="1400" dirty="0" smtClean="0">
-              <a:solidFill>
-                <a:schemeClr val="tx1"/>
-              </a:solidFill>
-            </a:endParaRPr>
           </a:p>
         </p:txBody>
       </p:sp>
@@ -15138,15 +15215,7 @@
                   <a:schemeClr val="tx1"/>
                 </a:solidFill>
               </a:rPr>
-              <a:t>c</a:t>
-            </a:r>
-            <a:r>
-              <a:rPr lang="en-US" sz="1400" dirty="0" smtClean="0">
-                <a:solidFill>
-                  <a:schemeClr val="tx1"/>
-                </a:solidFill>
-              </a:rPr>
-              <a:t>arts: [</a:t>
+              <a:t>carts: [</a:t>
             </a:r>
           </a:p>
           <a:p>
@@ -15299,11 +15368,6 @@
               </a:rPr>
               <a:t>_id: 9001</a:t>
             </a:r>
-            <a:endParaRPr lang="en-US" sz="1400" dirty="0" smtClean="0">
-              <a:solidFill>
-                <a:schemeClr val="tx1"/>
-              </a:solidFill>
-            </a:endParaRPr>
           </a:p>
         </p:txBody>
       </p:sp>
@@ -15380,11 +15444,6 @@
               </a:rPr>
               <a:t>_id: 9876</a:t>
             </a:r>
-            <a:endParaRPr lang="en-US" sz="1400" dirty="0" smtClean="0">
-              <a:solidFill>
-                <a:schemeClr val="tx1"/>
-              </a:solidFill>
-            </a:endParaRPr>
           </a:p>
         </p:txBody>
       </p:sp>
@@ -15599,11 +15658,6 @@
               </a:rPr>
               <a:t>_id: 42</a:t>
             </a:r>
-            <a:endParaRPr lang="en-US" sz="1400" dirty="0" smtClean="0">
-              <a:solidFill>
-                <a:schemeClr val="tx1"/>
-              </a:solidFill>
-            </a:endParaRPr>
           </a:p>
         </p:txBody>
       </p:sp>
@@ -15688,11 +15742,6 @@
               </a:rPr>
               <a:t>: 42</a:t>
             </a:r>
-            <a:endParaRPr lang="en-US" sz="1400" dirty="0" smtClean="0">
-              <a:solidFill>
-                <a:schemeClr val="tx1"/>
-              </a:solidFill>
-            </a:endParaRPr>
           </a:p>
         </p:txBody>
       </p:sp>
@@ -15777,11 +15826,6 @@
               </a:rPr>
               <a:t>: 42</a:t>
             </a:r>
-            <a:endParaRPr lang="en-US" sz="1400" dirty="0" smtClean="0">
-              <a:solidFill>
-                <a:schemeClr val="tx1"/>
-              </a:solidFill>
-            </a:endParaRPr>
           </a:p>
         </p:txBody>
       </p:sp>
@@ -16642,7 +16686,6 @@
               <a:rPr lang="en-US" sz="1700" dirty="0" smtClean="0"/>
               <a:t>By embedding references in both documents</a:t>
             </a:r>
-            <a:endParaRPr lang="en-US" sz="1700" dirty="0" smtClean="0"/>
           </a:p>
         </p:txBody>
       </p:sp>

</xml_diff>